<commit_message>
Plot purpose of all grants, not just IGOs
</commit_message>
<xml_diff>
--- a/figures/Final figures.pptx
+++ b/figures/Final figures.pptx
@@ -123,7 +123,7 @@
   </p:defaultTextStyle>
   <p:extLst>
     <p:ext uri="{EFAFB233-063F-42B5-8137-9DF3F51BA10A}">
-      <p15:sldGuideLst xmlns:p15="http://schemas.microsoft.com/office/powerpoint/2012/main" xmlns="">
+      <p15:sldGuideLst xmlns:p15="http://schemas.microsoft.com/office/powerpoint/2012/main">
         <p15:guide id="1" orient="horz" pos="2160">
           <p15:clr>
             <a:srgbClr val="A4A3A4"/>
@@ -3617,7 +3617,7 @@
   <p:timing>
     <p:tnLst>
       <p:par>
-        <p:cTn xmlns:p14="http://schemas.microsoft.com/office/powerpoint/2010/main" id="1" dur="indefinite" restart="never" nodeType="tmRoot"/>
+        <p:cTn id="1" dur="indefinite" restart="never" nodeType="tmRoot"/>
       </p:par>
     </p:tnLst>
   </p:timing>
@@ -3696,7 +3696,7 @@
   <p:timing>
     <p:tnLst>
       <p:par>
-        <p:cTn xmlns:p14="http://schemas.microsoft.com/office/powerpoint/2010/main" id="1" dur="indefinite" restart="never" nodeType="tmRoot"/>
+        <p:cTn id="1" dur="indefinite" restart="never" nodeType="tmRoot"/>
       </p:par>
     </p:tnLst>
   </p:timing>
@@ -3833,7 +3833,7 @@
   <p:timing>
     <p:tnLst>
       <p:par>
-        <p:cTn xmlns:p14="http://schemas.microsoft.com/office/powerpoint/2010/main" id="1" dur="indefinite" restart="never" nodeType="tmRoot"/>
+        <p:cTn id="1" dur="indefinite" restart="never" nodeType="tmRoot"/>
       </p:par>
     </p:tnLst>
   </p:timing>
@@ -3912,7 +3912,7 @@
   <p:timing>
     <p:tnLst>
       <p:par>
-        <p:cTn xmlns:p14="http://schemas.microsoft.com/office/powerpoint/2010/main" id="1" dur="indefinite" restart="never" nodeType="tmRoot"/>
+        <p:cTn id="1" dur="indefinite" restart="never" nodeType="tmRoot"/>
       </p:par>
     </p:tnLst>
   </p:timing>
@@ -4001,7 +4001,7 @@
   <p:timing>
     <p:tnLst>
       <p:par>
-        <p:cTn xmlns:p14="http://schemas.microsoft.com/office/powerpoint/2010/main" id="1" dur="indefinite" restart="never" nodeType="tmRoot"/>
+        <p:cTn id="1" dur="indefinite" restart="never" nodeType="tmRoot"/>
       </p:par>
     </p:tnLst>
   </p:timing>
@@ -4250,7 +4250,7 @@
   <p:timing>
     <p:tnLst>
       <p:par>
-        <p:cTn xmlns:p14="http://schemas.microsoft.com/office/powerpoint/2010/main" id="1" dur="indefinite" restart="never" nodeType="tmRoot"/>
+        <p:cTn id="1" dur="indefinite" restart="never" nodeType="tmRoot"/>
       </p:par>
     </p:tnLst>
   </p:timing>
@@ -4329,7 +4329,7 @@
   <p:timing>
     <p:tnLst>
       <p:par>
-        <p:cTn xmlns:p14="http://schemas.microsoft.com/office/powerpoint/2010/main" id="1" dur="indefinite" restart="never" nodeType="tmRoot"/>
+        <p:cTn id="1" dur="indefinite" restart="never" nodeType="tmRoot"/>
       </p:par>
     </p:tnLst>
   </p:timing>
@@ -4370,7 +4370,11 @@
           <a:p>
             <a:r>
               <a:rPr lang="en-US" dirty="0" smtClean="0"/>
-              <a:t>Purpose of grants awarded to IGOs</a:t>
+              <a:t>Purpose of </a:t>
+            </a:r>
+            <a:r>
+              <a:rPr lang="en-US" dirty="0" smtClean="0"/>
+              <a:t>grants</a:t>
             </a:r>
             <a:endParaRPr lang="en-US" dirty="0"/>
           </a:p>
@@ -4418,7 +4422,7 @@
   <p:timing>
     <p:tnLst>
       <p:par>
-        <p:cTn xmlns:p14="http://schemas.microsoft.com/office/powerpoint/2010/main" id="1" dur="indefinite" restart="never" nodeType="tmRoot"/>
+        <p:cTn id="1" dur="indefinite" restart="never" nodeType="tmRoot"/>
       </p:par>
     </p:tnLst>
   </p:timing>
@@ -4545,7 +4549,7 @@
   <p:timing>
     <p:tnLst>
       <p:par>
-        <p:cTn xmlns:p14="http://schemas.microsoft.com/office/powerpoint/2010/main" id="1" dur="indefinite" restart="never" nodeType="tmRoot"/>
+        <p:cTn id="1" dur="indefinite" restart="never" nodeType="tmRoot"/>
       </p:par>
     </p:tnLst>
   </p:timing>
@@ -4672,7 +4676,7 @@
   <p:timing>
     <p:tnLst>
       <p:par>
-        <p:cTn xmlns:p14="http://schemas.microsoft.com/office/powerpoint/2010/main" id="1" dur="indefinite" restart="never" nodeType="tmRoot"/>
+        <p:cTn id="1" dur="indefinite" restart="never" nodeType="tmRoot"/>
       </p:par>
     </p:tnLst>
   </p:timing>
@@ -4761,7 +4765,7 @@
   <p:timing>
     <p:tnLst>
       <p:par>
-        <p:cTn xmlns:p14="http://schemas.microsoft.com/office/powerpoint/2010/main" id="1" dur="indefinite" restart="never" nodeType="tmRoot"/>
+        <p:cTn id="1" dur="indefinite" restart="never" nodeType="tmRoot"/>
       </p:par>
     </p:tnLst>
   </p:timing>
@@ -4840,7 +4844,7 @@
   <p:timing>
     <p:tnLst>
       <p:par>
-        <p:cTn xmlns:p14="http://schemas.microsoft.com/office/powerpoint/2010/main" id="1" dur="indefinite" restart="never" nodeType="tmRoot"/>
+        <p:cTn id="1" dur="indefinite" restart="never" nodeType="tmRoot"/>
       </p:par>
     </p:tnLst>
   </p:timing>
@@ -4929,7 +4933,7 @@
   <p:timing>
     <p:tnLst>
       <p:par>
-        <p:cTn xmlns:p14="http://schemas.microsoft.com/office/powerpoint/2010/main" id="1" dur="indefinite" restart="never" nodeType="tmRoot"/>
+        <p:cTn id="1" dur="indefinite" restart="never" nodeType="tmRoot"/>
       </p:par>
     </p:tnLst>
   </p:timing>
@@ -5511,7 +5515,7 @@
   <a:extraClrSchemeLst/>
   <a:extLst>
     <a:ext uri="{05A4C25C-085E-4340-85A3-A5531E510DB2}">
-      <thm15:themeFamily xmlns:thm15="http://schemas.microsoft.com/office/thememl/2012/main" xmlns="" name="Office Theme" id="{62F939B6-93AF-4DB8-9C6B-D6C7DFDC589F}" vid="{4A3C46E8-61CC-4603-A589-7422A47A8E4A}"/>
+      <thm15:themeFamily xmlns:thm15="http://schemas.microsoft.com/office/thememl/2012/main" name="Office Theme" id="{62F939B6-93AF-4DB8-9C6B-D6C7DFDC589F}" vid="{4A3C46E8-61CC-4603-A589-7422A47A8E4A}"/>
     </a:ext>
   </a:extLst>
 </a:theme>

</xml_diff>

<commit_message>
Collapse NGOs and NPOs
</commit_message>
<xml_diff>
--- a/figures/Final figures.pptx
+++ b/figures/Final figures.pptx
@@ -222,7 +222,7 @@
           <a:p>
             <a:fld id="{F46ED9D9-E6D3-6345-9D03-0EE5343EACB2}" type="datetimeFigureOut">
               <a:rPr lang="en-US" smtClean="0"/>
-              <a:t>9/16/15</a:t>
+              <a:t>9/17/15</a:t>
             </a:fld>
             <a:endParaRPr lang="en-US"/>
           </a:p>
@@ -755,7 +755,7 @@
           <a:p>
             <a:fld id="{DA396DAB-EEA9-6D44-82E8-9CF945C5AED9}" type="datetimeFigureOut">
               <a:rPr lang="en-US" smtClean="0"/>
-              <a:t>9/16/15</a:t>
+              <a:t>9/17/15</a:t>
             </a:fld>
             <a:endParaRPr lang="en-US"/>
           </a:p>
@@ -925,7 +925,7 @@
           <a:p>
             <a:fld id="{DA396DAB-EEA9-6D44-82E8-9CF945C5AED9}" type="datetimeFigureOut">
               <a:rPr lang="en-US" smtClean="0"/>
-              <a:t>9/16/15</a:t>
+              <a:t>9/17/15</a:t>
             </a:fld>
             <a:endParaRPr lang="en-US"/>
           </a:p>
@@ -1105,7 +1105,7 @@
           <a:p>
             <a:fld id="{DA396DAB-EEA9-6D44-82E8-9CF945C5AED9}" type="datetimeFigureOut">
               <a:rPr lang="en-US" smtClean="0"/>
-              <a:t>9/16/15</a:t>
+              <a:t>9/17/15</a:t>
             </a:fld>
             <a:endParaRPr lang="en-US"/>
           </a:p>
@@ -1275,7 +1275,7 @@
           <a:p>
             <a:fld id="{DA396DAB-EEA9-6D44-82E8-9CF945C5AED9}" type="datetimeFigureOut">
               <a:rPr lang="en-US" smtClean="0"/>
-              <a:t>9/16/15</a:t>
+              <a:t>9/17/15</a:t>
             </a:fld>
             <a:endParaRPr lang="en-US"/>
           </a:p>
@@ -1521,7 +1521,7 @@
           <a:p>
             <a:fld id="{DA396DAB-EEA9-6D44-82E8-9CF945C5AED9}" type="datetimeFigureOut">
               <a:rPr lang="en-US" smtClean="0"/>
-              <a:t>9/16/15</a:t>
+              <a:t>9/17/15</a:t>
             </a:fld>
             <a:endParaRPr lang="en-US"/>
           </a:p>
@@ -1809,7 +1809,7 @@
           <a:p>
             <a:fld id="{DA396DAB-EEA9-6D44-82E8-9CF945C5AED9}" type="datetimeFigureOut">
               <a:rPr lang="en-US" smtClean="0"/>
-              <a:t>9/16/15</a:t>
+              <a:t>9/17/15</a:t>
             </a:fld>
             <a:endParaRPr lang="en-US"/>
           </a:p>
@@ -2231,7 +2231,7 @@
           <a:p>
             <a:fld id="{DA396DAB-EEA9-6D44-82E8-9CF945C5AED9}" type="datetimeFigureOut">
               <a:rPr lang="en-US" smtClean="0"/>
-              <a:t>9/16/15</a:t>
+              <a:t>9/17/15</a:t>
             </a:fld>
             <a:endParaRPr lang="en-US"/>
           </a:p>
@@ -2349,7 +2349,7 @@
           <a:p>
             <a:fld id="{DA396DAB-EEA9-6D44-82E8-9CF945C5AED9}" type="datetimeFigureOut">
               <a:rPr lang="en-US" smtClean="0"/>
-              <a:t>9/16/15</a:t>
+              <a:t>9/17/15</a:t>
             </a:fld>
             <a:endParaRPr lang="en-US"/>
           </a:p>
@@ -2444,7 +2444,7 @@
           <a:p>
             <a:fld id="{DA396DAB-EEA9-6D44-82E8-9CF945C5AED9}" type="datetimeFigureOut">
               <a:rPr lang="en-US" smtClean="0"/>
-              <a:t>9/16/15</a:t>
+              <a:t>9/17/15</a:t>
             </a:fld>
             <a:endParaRPr lang="en-US"/>
           </a:p>
@@ -2721,7 +2721,7 @@
           <a:p>
             <a:fld id="{DA396DAB-EEA9-6D44-82E8-9CF945C5AED9}" type="datetimeFigureOut">
               <a:rPr lang="en-US" smtClean="0"/>
-              <a:t>9/16/15</a:t>
+              <a:t>9/17/15</a:t>
             </a:fld>
             <a:endParaRPr lang="en-US"/>
           </a:p>
@@ -2974,7 +2974,7 @@
           <a:p>
             <a:fld id="{DA396DAB-EEA9-6D44-82E8-9CF945C5AED9}" type="datetimeFigureOut">
               <a:rPr lang="en-US" smtClean="0"/>
-              <a:t>9/16/15</a:t>
+              <a:t>9/17/15</a:t>
             </a:fld>
             <a:endParaRPr lang="en-US"/>
           </a:p>
@@ -3187,7 +3187,7 @@
           <a:p>
             <a:fld id="{DA396DAB-EEA9-6D44-82E8-9CF945C5AED9}" type="datetimeFigureOut">
               <a:rPr lang="en-US" smtClean="0"/>
-              <a:t>9/16/15</a:t>
+              <a:t>9/17/15</a:t>
             </a:fld>
             <a:endParaRPr lang="en-US"/>
           </a:p>
@@ -4370,11 +4370,7 @@
           <a:p>
             <a:r>
               <a:rPr lang="en-US" dirty="0" smtClean="0"/>
-              <a:t>Purpose of </a:t>
-            </a:r>
-            <a:r>
-              <a:rPr lang="en-US" dirty="0" smtClean="0"/>
-              <a:t>grants</a:t>
+              <a:t>Purpose of grants</a:t>
             </a:r>
             <a:endParaRPr lang="en-US" dirty="0"/>
           </a:p>

</xml_diff>